<commit_message>
l'API rest j'ai commencé a reflechir, nettoyage a modifier mais possiblement pas utile
</commit_message>
<xml_diff>
--- a/diagrame fonctionnement.pptx
+++ b/diagrame fonctionnement.pptx
@@ -288,6 +288,7 @@
           <a:p>
             <a:fld id="{0D27EC15-95A9-4BA2-9BC9-87E89AF03908}" type="datetimeFigureOut">
               <a:rPr lang="fr-FR" smtClean="0"/>
+              <a:pPr/>
               <a:t>06/10/2021</a:t>
             </a:fld>
             <a:endParaRPr lang="fr-FR"/>
@@ -330,6 +331,7 @@
           <a:p>
             <a:fld id="{D11F0953-0B37-4EC3-B382-7D82AD216680}" type="slidenum">
               <a:rPr lang="fr-FR" smtClean="0"/>
+              <a:pPr/>
               <a:t>‹N°›</a:t>
             </a:fld>
             <a:endParaRPr lang="fr-FR"/>
@@ -453,6 +455,7 @@
           <a:p>
             <a:fld id="{0D27EC15-95A9-4BA2-9BC9-87E89AF03908}" type="datetimeFigureOut">
               <a:rPr lang="fr-FR" smtClean="0"/>
+              <a:pPr/>
               <a:t>06/10/2021</a:t>
             </a:fld>
             <a:endParaRPr lang="fr-FR"/>
@@ -495,6 +498,7 @@
           <a:p>
             <a:fld id="{D11F0953-0B37-4EC3-B382-7D82AD216680}" type="slidenum">
               <a:rPr lang="fr-FR" smtClean="0"/>
+              <a:pPr/>
               <a:t>‹N°›</a:t>
             </a:fld>
             <a:endParaRPr lang="fr-FR"/>
@@ -628,6 +632,7 @@
           <a:p>
             <a:fld id="{0D27EC15-95A9-4BA2-9BC9-87E89AF03908}" type="datetimeFigureOut">
               <a:rPr lang="fr-FR" smtClean="0"/>
+              <a:pPr/>
               <a:t>06/10/2021</a:t>
             </a:fld>
             <a:endParaRPr lang="fr-FR"/>
@@ -670,6 +675,7 @@
           <a:p>
             <a:fld id="{D11F0953-0B37-4EC3-B382-7D82AD216680}" type="slidenum">
               <a:rPr lang="fr-FR" smtClean="0"/>
+              <a:pPr/>
               <a:t>‹N°›</a:t>
             </a:fld>
             <a:endParaRPr lang="fr-FR"/>
@@ -793,6 +799,7 @@
           <a:p>
             <a:fld id="{0D27EC15-95A9-4BA2-9BC9-87E89AF03908}" type="datetimeFigureOut">
               <a:rPr lang="fr-FR" smtClean="0"/>
+              <a:pPr/>
               <a:t>06/10/2021</a:t>
             </a:fld>
             <a:endParaRPr lang="fr-FR"/>
@@ -835,6 +842,7 @@
           <a:p>
             <a:fld id="{D11F0953-0B37-4EC3-B382-7D82AD216680}" type="slidenum">
               <a:rPr lang="fr-FR" smtClean="0"/>
+              <a:pPr/>
               <a:t>‹N°›</a:t>
             </a:fld>
             <a:endParaRPr lang="fr-FR"/>
@@ -1034,6 +1042,7 @@
           <a:p>
             <a:fld id="{0D27EC15-95A9-4BA2-9BC9-87E89AF03908}" type="datetimeFigureOut">
               <a:rPr lang="fr-FR" smtClean="0"/>
+              <a:pPr/>
               <a:t>06/10/2021</a:t>
             </a:fld>
             <a:endParaRPr lang="fr-FR"/>
@@ -1076,6 +1085,7 @@
           <a:p>
             <a:fld id="{D11F0953-0B37-4EC3-B382-7D82AD216680}" type="slidenum">
               <a:rPr lang="fr-FR" smtClean="0"/>
+              <a:pPr/>
               <a:t>‹N°›</a:t>
             </a:fld>
             <a:endParaRPr lang="fr-FR"/>
@@ -1317,6 +1327,7 @@
           <a:p>
             <a:fld id="{0D27EC15-95A9-4BA2-9BC9-87E89AF03908}" type="datetimeFigureOut">
               <a:rPr lang="fr-FR" smtClean="0"/>
+              <a:pPr/>
               <a:t>06/10/2021</a:t>
             </a:fld>
             <a:endParaRPr lang="fr-FR"/>
@@ -1359,6 +1370,7 @@
           <a:p>
             <a:fld id="{D11F0953-0B37-4EC3-B382-7D82AD216680}" type="slidenum">
               <a:rPr lang="fr-FR" smtClean="0"/>
+              <a:pPr/>
               <a:t>‹N°›</a:t>
             </a:fld>
             <a:endParaRPr lang="fr-FR"/>
@@ -1734,6 +1746,7 @@
           <a:p>
             <a:fld id="{0D27EC15-95A9-4BA2-9BC9-87E89AF03908}" type="datetimeFigureOut">
               <a:rPr lang="fr-FR" smtClean="0"/>
+              <a:pPr/>
               <a:t>06/10/2021</a:t>
             </a:fld>
             <a:endParaRPr lang="fr-FR"/>
@@ -1776,6 +1789,7 @@
           <a:p>
             <a:fld id="{D11F0953-0B37-4EC3-B382-7D82AD216680}" type="slidenum">
               <a:rPr lang="fr-FR" smtClean="0"/>
+              <a:pPr/>
               <a:t>‹N°›</a:t>
             </a:fld>
             <a:endParaRPr lang="fr-FR"/>
@@ -1847,6 +1861,7 @@
           <a:p>
             <a:fld id="{0D27EC15-95A9-4BA2-9BC9-87E89AF03908}" type="datetimeFigureOut">
               <a:rPr lang="fr-FR" smtClean="0"/>
+              <a:pPr/>
               <a:t>06/10/2021</a:t>
             </a:fld>
             <a:endParaRPr lang="fr-FR"/>
@@ -1889,6 +1904,7 @@
           <a:p>
             <a:fld id="{D11F0953-0B37-4EC3-B382-7D82AD216680}" type="slidenum">
               <a:rPr lang="fr-FR" smtClean="0"/>
+              <a:pPr/>
               <a:t>‹N°›</a:t>
             </a:fld>
             <a:endParaRPr lang="fr-FR"/>
@@ -1937,6 +1953,7 @@
           <a:p>
             <a:fld id="{0D27EC15-95A9-4BA2-9BC9-87E89AF03908}" type="datetimeFigureOut">
               <a:rPr lang="fr-FR" smtClean="0"/>
+              <a:pPr/>
               <a:t>06/10/2021</a:t>
             </a:fld>
             <a:endParaRPr lang="fr-FR"/>
@@ -1979,6 +1996,7 @@
           <a:p>
             <a:fld id="{D11F0953-0B37-4EC3-B382-7D82AD216680}" type="slidenum">
               <a:rPr lang="fr-FR" smtClean="0"/>
+              <a:pPr/>
               <a:t>‹N°›</a:t>
             </a:fld>
             <a:endParaRPr lang="fr-FR"/>
@@ -2209,6 +2227,7 @@
           <a:p>
             <a:fld id="{0D27EC15-95A9-4BA2-9BC9-87E89AF03908}" type="datetimeFigureOut">
               <a:rPr lang="fr-FR" smtClean="0"/>
+              <a:pPr/>
               <a:t>06/10/2021</a:t>
             </a:fld>
             <a:endParaRPr lang="fr-FR"/>
@@ -2251,6 +2270,7 @@
           <a:p>
             <a:fld id="{D11F0953-0B37-4EC3-B382-7D82AD216680}" type="slidenum">
               <a:rPr lang="fr-FR" smtClean="0"/>
+              <a:pPr/>
               <a:t>‹N°›</a:t>
             </a:fld>
             <a:endParaRPr lang="fr-FR"/>
@@ -2457,6 +2477,7 @@
           <a:p>
             <a:fld id="{0D27EC15-95A9-4BA2-9BC9-87E89AF03908}" type="datetimeFigureOut">
               <a:rPr lang="fr-FR" smtClean="0"/>
+              <a:pPr/>
               <a:t>06/10/2021</a:t>
             </a:fld>
             <a:endParaRPr lang="fr-FR"/>
@@ -2499,6 +2520,7 @@
           <a:p>
             <a:fld id="{D11F0953-0B37-4EC3-B382-7D82AD216680}" type="slidenum">
               <a:rPr lang="fr-FR" smtClean="0"/>
+              <a:pPr/>
               <a:t>‹N°›</a:t>
             </a:fld>
             <a:endParaRPr lang="fr-FR"/>
@@ -2665,6 +2687,7 @@
           <a:p>
             <a:fld id="{0D27EC15-95A9-4BA2-9BC9-87E89AF03908}" type="datetimeFigureOut">
               <a:rPr lang="fr-FR" smtClean="0"/>
+              <a:pPr/>
               <a:t>06/10/2021</a:t>
             </a:fld>
             <a:endParaRPr lang="fr-FR"/>
@@ -2743,6 +2766,7 @@
           <a:p>
             <a:fld id="{D11F0953-0B37-4EC3-B382-7D82AD216680}" type="slidenum">
               <a:rPr lang="fr-FR" smtClean="0"/>
+              <a:pPr/>
               <a:t>‹N°›</a:t>
             </a:fld>
             <a:endParaRPr lang="fr-FR"/>
@@ -3043,7 +3067,7 @@
         </p:nvSpPr>
         <p:spPr>
           <a:xfrm>
-            <a:off x="3275856" y="188640"/>
+            <a:off x="0" y="116632"/>
             <a:ext cx="1944216" cy="1003466"/>
           </a:xfrm>
           <a:prstGeom prst="rect">
@@ -3087,7 +3111,7 @@
         </p:nvSpPr>
         <p:spPr>
           <a:xfrm>
-            <a:off x="2195736" y="1340768"/>
+            <a:off x="0" y="1484784"/>
             <a:ext cx="1889086" cy="975012"/>
           </a:xfrm>
           <a:prstGeom prst="rect">
@@ -3131,7 +3155,7 @@
         </p:nvSpPr>
         <p:spPr>
           <a:xfrm>
-            <a:off x="4372854" y="1340768"/>
+            <a:off x="2411760" y="133884"/>
             <a:ext cx="1889086" cy="975012"/>
           </a:xfrm>
           <a:prstGeom prst="rect">
@@ -3175,7 +3199,7 @@
         </p:nvSpPr>
         <p:spPr>
           <a:xfrm>
-            <a:off x="3203848" y="2492896"/>
+            <a:off x="3195222" y="2348880"/>
             <a:ext cx="1889086" cy="975012"/>
           </a:xfrm>
           <a:prstGeom prst="rect">
@@ -3217,16 +3241,16 @@
       </p:sp>
       <p:sp>
         <p:nvSpPr>
-          <p:cNvPr id="8" name="Rectangle 7"/>
+          <p:cNvPr id="10" name="Losange 9"/>
           <p:cNvSpPr/>
           <p:nvPr/>
         </p:nvSpPr>
         <p:spPr>
           <a:xfrm>
-            <a:off x="5796136" y="2492896"/>
-            <a:ext cx="1889086" cy="975012"/>
-          </a:xfrm>
-          <a:prstGeom prst="rect">
+            <a:off x="3203848" y="3573016"/>
+            <a:ext cx="1872208" cy="1368152"/>
+          </a:xfrm>
+          <a:prstGeom prst="diamond">
             <a:avLst/>
           </a:prstGeom>
         </p:spPr>
@@ -3253,7 +3277,7 @@
             <a:pPr algn="ctr"/>
             <a:r>
               <a:rPr lang="fr-FR" dirty="0" smtClean="0"/>
-              <a:t>Voir son profil</a:t>
+              <a:t>Si docteur</a:t>
             </a:r>
             <a:endParaRPr lang="fr-FR" dirty="0"/>
           </a:p>
@@ -3261,16 +3285,16 @@
       </p:sp>
       <p:sp>
         <p:nvSpPr>
-          <p:cNvPr id="10" name="Losange 9"/>
+          <p:cNvPr id="11" name="Rectangle 10"/>
           <p:cNvSpPr/>
           <p:nvPr/>
         </p:nvSpPr>
         <p:spPr>
           <a:xfrm>
-            <a:off x="3203848" y="3573016"/>
-            <a:ext cx="1872208" cy="1368152"/>
-          </a:xfrm>
-          <a:prstGeom prst="diamond">
+            <a:off x="5796136" y="3771788"/>
+            <a:ext cx="1889086" cy="975012"/>
+          </a:xfrm>
+          <a:prstGeom prst="rect">
             <a:avLst/>
           </a:prstGeom>
         </p:spPr>
@@ -3297,7 +3321,15 @@
             <a:pPr algn="ctr"/>
             <a:r>
               <a:rPr lang="fr-FR" dirty="0" smtClean="0"/>
-              <a:t>Si docteur</a:t>
+              <a:t>Voir profil des </a:t>
+            </a:r>
+            <a:r>
+              <a:rPr lang="fr-FR" dirty="0" smtClean="0"/>
+              <a:t>patients et so</a:t>
+            </a:r>
+            <a:r>
+              <a:rPr lang="fr-FR" dirty="0" smtClean="0"/>
+              <a:t>n profil</a:t>
             </a:r>
             <a:endParaRPr lang="fr-FR" dirty="0"/>
           </a:p>
@@ -3305,13 +3337,13 @@
       </p:sp>
       <p:sp>
         <p:nvSpPr>
-          <p:cNvPr id="11" name="Rectangle 10"/>
+          <p:cNvPr id="12" name="Rectangle 11"/>
           <p:cNvSpPr/>
           <p:nvPr/>
         </p:nvSpPr>
         <p:spPr>
           <a:xfrm>
-            <a:off x="5796136" y="3771788"/>
+            <a:off x="539552" y="3771788"/>
             <a:ext cx="1889086" cy="975012"/>
           </a:xfrm>
           <a:prstGeom prst="rect">
@@ -3341,7 +3373,7 @@
             <a:pPr algn="ctr"/>
             <a:r>
               <a:rPr lang="fr-FR" dirty="0" smtClean="0"/>
-              <a:t>Voir profil des patients</a:t>
+              <a:t>Voir seulement son profil</a:t>
             </a:r>
             <a:endParaRPr lang="fr-FR" dirty="0"/>
           </a:p>
@@ -3349,14 +3381,14 @@
       </p:sp>
       <p:sp>
         <p:nvSpPr>
-          <p:cNvPr id="12" name="Rectangle 11"/>
+          <p:cNvPr id="13" name="Rectangle 12"/>
           <p:cNvSpPr/>
           <p:nvPr/>
         </p:nvSpPr>
         <p:spPr>
           <a:xfrm>
-            <a:off x="539552" y="3771788"/>
-            <a:ext cx="1889086" cy="975012"/>
+            <a:off x="539552" y="5445224"/>
+            <a:ext cx="1889086" cy="1296144"/>
           </a:xfrm>
           <a:prstGeom prst="rect">
             <a:avLst/>
@@ -3385,7 +3417,7 @@
             <a:pPr algn="ctr"/>
             <a:r>
               <a:rPr lang="fr-FR" dirty="0" smtClean="0"/>
-              <a:t>Voir seulement son profil</a:t>
+              <a:t>Modification possible des infos personnel &amp; de sécurité</a:t>
             </a:r>
             <a:endParaRPr lang="fr-FR" dirty="0"/>
           </a:p>
@@ -3393,14 +3425,14 @@
       </p:sp>
       <p:sp>
         <p:nvSpPr>
-          <p:cNvPr id="13" name="Rectangle 12"/>
+          <p:cNvPr id="14" name="Rectangle 13"/>
           <p:cNvSpPr/>
           <p:nvPr/>
         </p:nvSpPr>
         <p:spPr>
           <a:xfrm>
-            <a:off x="539552" y="5445224"/>
-            <a:ext cx="1889086" cy="1296144"/>
+            <a:off x="5796136" y="5285450"/>
+            <a:ext cx="1889086" cy="1572550"/>
           </a:xfrm>
           <a:prstGeom prst="rect">
             <a:avLst/>
@@ -3429,51 +3461,11 @@
             <a:pPr algn="ctr"/>
             <a:r>
               <a:rPr lang="fr-FR" dirty="0" smtClean="0"/>
-              <a:t>Modification possible des infos personnel &amp; de sécurité</a:t>
-            </a:r>
-            <a:endParaRPr lang="fr-FR" dirty="0"/>
-          </a:p>
-        </p:txBody>
-      </p:sp>
-      <p:sp>
-        <p:nvSpPr>
-          <p:cNvPr id="14" name="Rectangle 13"/>
-          <p:cNvSpPr/>
-          <p:nvPr/>
-        </p:nvSpPr>
-        <p:spPr>
-          <a:xfrm>
-            <a:off x="5796136" y="5429466"/>
-            <a:ext cx="1889086" cy="1368152"/>
-          </a:xfrm>
-          <a:prstGeom prst="rect">
-            <a:avLst/>
-          </a:prstGeom>
-        </p:spPr>
-        <p:style>
-          <a:lnRef idx="2">
-            <a:schemeClr val="accent1">
-              <a:shade val="50000"/>
-            </a:schemeClr>
-          </a:lnRef>
-          <a:fillRef idx="1">
-            <a:schemeClr val="accent1"/>
-          </a:fillRef>
-          <a:effectRef idx="0">
-            <a:schemeClr val="accent1"/>
-          </a:effectRef>
-          <a:fontRef idx="minor">
-            <a:schemeClr val="lt1"/>
-          </a:fontRef>
-        </p:style>
-        <p:txBody>
-          <a:bodyPr rtlCol="0" anchor="ctr"/>
-          <a:lstStyle/>
-          <a:p>
-            <a:pPr algn="ctr"/>
+              <a:t>Modification possible du profil des infos personnel &amp; de </a:t>
+            </a:r>
             <a:r>
               <a:rPr lang="fr-FR" dirty="0" smtClean="0"/>
-              <a:t>Modification possible du profil des infos personnel &amp; de santé</a:t>
+              <a:t>santé &amp; sécu de son profil</a:t>
             </a:r>
             <a:endParaRPr lang="fr-FR" dirty="0"/>
           </a:p>
@@ -3487,7 +3479,7 @@
         </p:nvSpPr>
         <p:spPr>
           <a:xfrm>
-            <a:off x="3203848" y="5445224"/>
+            <a:off x="5796136" y="2348880"/>
             <a:ext cx="1889086" cy="975012"/>
           </a:xfrm>
           <a:prstGeom prst="rect">
@@ -3542,125 +3534,8 @@
         </p:nvCxnSpPr>
         <p:spPr>
           <a:xfrm flipH="1">
-            <a:off x="3140279" y="1192106"/>
-            <a:ext cx="1107685" cy="148662"/>
-          </a:xfrm>
-          <a:prstGeom prst="straightConnector1">
-            <a:avLst/>
-          </a:prstGeom>
-          <a:ln w="28575">
-            <a:solidFill>
-              <a:schemeClr val="accent2"/>
-            </a:solidFill>
-            <a:tailEnd type="arrow"/>
-          </a:ln>
-        </p:spPr>
-        <p:style>
-          <a:lnRef idx="1">
-            <a:schemeClr val="accent1"/>
-          </a:lnRef>
-          <a:fillRef idx="0">
-            <a:schemeClr val="accent1"/>
-          </a:fillRef>
-          <a:effectRef idx="0">
-            <a:schemeClr val="accent1"/>
-          </a:effectRef>
-          <a:fontRef idx="minor">
-            <a:schemeClr val="tx1"/>
-          </a:fontRef>
-        </p:style>
-      </p:cxnSp>
-      <p:cxnSp>
-        <p:nvCxnSpPr>
-          <p:cNvPr id="18" name="Connecteur droit avec flèche 17"/>
-          <p:cNvCxnSpPr>
-            <a:stCxn id="4" idx="2"/>
-            <a:endCxn id="6" idx="0"/>
-          </p:cNvCxnSpPr>
-          <p:nvPr/>
-        </p:nvCxnSpPr>
-        <p:spPr>
-          <a:xfrm>
-            <a:off x="4247964" y="1192106"/>
-            <a:ext cx="1069433" cy="148662"/>
-          </a:xfrm>
-          <a:prstGeom prst="straightConnector1">
-            <a:avLst/>
-          </a:prstGeom>
-          <a:ln w="28575">
-            <a:solidFill>
-              <a:schemeClr val="accent2"/>
-            </a:solidFill>
-            <a:tailEnd type="arrow"/>
-          </a:ln>
-        </p:spPr>
-        <p:style>
-          <a:lnRef idx="1">
-            <a:schemeClr val="accent1"/>
-          </a:lnRef>
-          <a:fillRef idx="0">
-            <a:schemeClr val="accent1"/>
-          </a:fillRef>
-          <a:effectRef idx="0">
-            <a:schemeClr val="accent1"/>
-          </a:effectRef>
-          <a:fontRef idx="minor">
-            <a:schemeClr val="tx1"/>
-          </a:fontRef>
-        </p:style>
-      </p:cxnSp>
-      <p:cxnSp>
-        <p:nvCxnSpPr>
-          <p:cNvPr id="21" name="Connecteur droit avec flèche 20"/>
-          <p:cNvCxnSpPr>
-            <a:stCxn id="5" idx="2"/>
-            <a:endCxn id="7" idx="0"/>
-          </p:cNvCxnSpPr>
-          <p:nvPr/>
-        </p:nvCxnSpPr>
-        <p:spPr>
-          <a:xfrm>
-            <a:off x="3140279" y="2315780"/>
-            <a:ext cx="1008112" cy="177116"/>
-          </a:xfrm>
-          <a:prstGeom prst="straightConnector1">
-            <a:avLst/>
-          </a:prstGeom>
-          <a:ln w="28575">
-            <a:solidFill>
-              <a:schemeClr val="accent2"/>
-            </a:solidFill>
-            <a:tailEnd type="arrow"/>
-          </a:ln>
-        </p:spPr>
-        <p:style>
-          <a:lnRef idx="1">
-            <a:schemeClr val="accent1"/>
-          </a:lnRef>
-          <a:fillRef idx="0">
-            <a:schemeClr val="accent1"/>
-          </a:fillRef>
-          <a:effectRef idx="0">
-            <a:schemeClr val="accent1"/>
-          </a:effectRef>
-          <a:fontRef idx="minor">
-            <a:schemeClr val="tx1"/>
-          </a:fontRef>
-        </p:style>
-      </p:cxnSp>
-      <p:cxnSp>
-        <p:nvCxnSpPr>
-          <p:cNvPr id="22" name="Connecteur droit avec flèche 21"/>
-          <p:cNvCxnSpPr>
-            <a:stCxn id="6" idx="2"/>
-            <a:endCxn id="7" idx="0"/>
-          </p:cNvCxnSpPr>
-          <p:nvPr/>
-        </p:nvCxnSpPr>
-        <p:spPr>
-          <a:xfrm flipH="1">
-            <a:off x="4148391" y="2315780"/>
-            <a:ext cx="1169006" cy="177116"/>
+            <a:off x="944543" y="1120098"/>
+            <a:ext cx="27565" cy="364686"/>
           </a:xfrm>
           <a:prstGeom prst="straightConnector1">
             <a:avLst/>
@@ -3736,9 +3611,9 @@
           <p:nvPr/>
         </p:nvCxnSpPr>
         <p:spPr>
-          <a:xfrm flipH="1">
-            <a:off x="4139952" y="3467908"/>
-            <a:ext cx="8439" cy="105108"/>
+          <a:xfrm>
+            <a:off x="4139765" y="3323892"/>
+            <a:ext cx="187" cy="249124"/>
           </a:xfrm>
           <a:prstGeom prst="straightConnector1">
             <a:avLst/>
@@ -3773,7 +3648,7 @@
         </p:nvSpPr>
         <p:spPr>
           <a:xfrm>
-            <a:off x="5076056" y="3861048"/>
+            <a:off x="5004048" y="3933056"/>
             <a:ext cx="648072" cy="369332"/>
           </a:xfrm>
           <a:prstGeom prst="rect">
@@ -3842,7 +3717,7 @@
         </p:nvSpPr>
         <p:spPr>
           <a:xfrm>
-            <a:off x="2555776" y="3861048"/>
+            <a:off x="5436096" y="1196752"/>
             <a:ext cx="648072" cy="369332"/>
           </a:xfrm>
           <a:prstGeom prst="rect">
@@ -3872,8 +3747,8 @@
         </p:nvSpPr>
         <p:spPr>
           <a:xfrm>
-            <a:off x="539552" y="4725144"/>
-            <a:ext cx="1872208" cy="720080"/>
+            <a:off x="539552" y="4751022"/>
+            <a:ext cx="1872208" cy="694202"/>
           </a:xfrm>
           <a:prstGeom prst="upArrow">
             <a:avLst>
@@ -3919,8 +3794,8 @@
         </p:nvSpPr>
         <p:spPr>
           <a:xfrm>
-            <a:off x="5796136" y="4751022"/>
-            <a:ext cx="1872208" cy="648072"/>
+            <a:off x="5796136" y="4760313"/>
+            <a:ext cx="1872208" cy="504056"/>
           </a:xfrm>
           <a:prstGeom prst="upArrow">
             <a:avLst>
@@ -3958,19 +3833,115 @@
           </a:p>
         </p:txBody>
       </p:sp>
+      <p:sp>
+        <p:nvSpPr>
+          <p:cNvPr id="53" name="Losange 52"/>
+          <p:cNvSpPr/>
+          <p:nvPr/>
+        </p:nvSpPr>
+        <p:spPr>
+          <a:xfrm>
+            <a:off x="4716016" y="-61888"/>
+            <a:ext cx="2448272" cy="1368152"/>
+          </a:xfrm>
+          <a:prstGeom prst="diamond">
+            <a:avLst/>
+          </a:prstGeom>
+        </p:spPr>
+        <p:style>
+          <a:lnRef idx="2">
+            <a:schemeClr val="accent1">
+              <a:shade val="50000"/>
+            </a:schemeClr>
+          </a:lnRef>
+          <a:fillRef idx="1">
+            <a:schemeClr val="accent1"/>
+          </a:fillRef>
+          <a:effectRef idx="0">
+            <a:schemeClr val="accent1"/>
+          </a:effectRef>
+          <a:fontRef idx="minor">
+            <a:schemeClr val="lt1"/>
+          </a:fontRef>
+        </p:style>
+        <p:txBody>
+          <a:bodyPr rtlCol="0" anchor="ctr"/>
+          <a:lstStyle/>
+          <a:p>
+            <a:pPr algn="ctr"/>
+            <a:r>
+              <a:rPr lang="fr-FR" dirty="0" smtClean="0"/>
+              <a:t>Si inscription </a:t>
+            </a:r>
+            <a:r>
+              <a:rPr lang="fr-FR" dirty="0" smtClean="0"/>
+              <a:t>docteur</a:t>
+            </a:r>
+            <a:endParaRPr lang="fr-FR" dirty="0"/>
+          </a:p>
+        </p:txBody>
+      </p:sp>
+      <p:sp>
+        <p:nvSpPr>
+          <p:cNvPr id="54" name="Rectangle 53"/>
+          <p:cNvSpPr/>
+          <p:nvPr/>
+        </p:nvSpPr>
+        <p:spPr>
+          <a:xfrm>
+            <a:off x="6228184" y="1196752"/>
+            <a:ext cx="1889086" cy="975012"/>
+          </a:xfrm>
+          <a:prstGeom prst="rect">
+            <a:avLst/>
+          </a:prstGeom>
+        </p:spPr>
+        <p:style>
+          <a:lnRef idx="2">
+            <a:schemeClr val="accent1">
+              <a:shade val="50000"/>
+            </a:schemeClr>
+          </a:lnRef>
+          <a:fillRef idx="1">
+            <a:schemeClr val="accent1"/>
+          </a:fillRef>
+          <a:effectRef idx="0">
+            <a:schemeClr val="accent1"/>
+          </a:effectRef>
+          <a:fontRef idx="minor">
+            <a:schemeClr val="lt1"/>
+          </a:fontRef>
+        </p:style>
+        <p:txBody>
+          <a:bodyPr rtlCol="0" anchor="ctr"/>
+          <a:lstStyle/>
+          <a:p>
+            <a:pPr algn="ctr"/>
+            <a:r>
+              <a:rPr lang="fr-FR" dirty="0" smtClean="0"/>
+              <a:t>Attente validation </a:t>
+            </a:r>
+            <a:r>
+              <a:rPr lang="fr-FR" dirty="0" err="1" smtClean="0"/>
+              <a:t>Admin</a:t>
+            </a:r>
+            <a:endParaRPr lang="fr-FR" dirty="0"/>
+          </a:p>
+        </p:txBody>
+      </p:sp>
       <p:cxnSp>
         <p:nvCxnSpPr>
-          <p:cNvPr id="46" name="Connecteur droit avec flèche 45"/>
+          <p:cNvPr id="63" name="Connecteur droit avec flèche 62"/>
           <p:cNvCxnSpPr>
-            <a:stCxn id="15" idx="0"/>
-            <a:endCxn id="10" idx="2"/>
+            <a:stCxn id="53" idx="3"/>
+            <a:endCxn id="54" idx="0"/>
           </p:cNvCxnSpPr>
           <p:nvPr/>
         </p:nvCxnSpPr>
         <p:spPr>
-          <a:xfrm flipH="1" flipV="1">
-            <a:off x="4139952" y="4941168"/>
-            <a:ext cx="8439" cy="504056"/>
+          <a:xfrm>
+            <a:off x="7164288" y="622188"/>
+            <a:ext cx="8439" cy="574564"/>
           </a:xfrm>
           <a:prstGeom prst="straightConnector1">
             <a:avLst/>
@@ -3997,6 +3968,304 @@
           </a:fontRef>
         </p:style>
       </p:cxnSp>
+      <p:cxnSp>
+        <p:nvCxnSpPr>
+          <p:cNvPr id="70" name="Forme 49"/>
+          <p:cNvCxnSpPr>
+            <a:stCxn id="53" idx="2"/>
+            <a:endCxn id="7" idx="0"/>
+          </p:cNvCxnSpPr>
+          <p:nvPr/>
+        </p:nvCxnSpPr>
+        <p:spPr>
+          <a:xfrm rot="5400000">
+            <a:off x="4518651" y="927379"/>
+            <a:ext cx="1042616" cy="1800387"/>
+          </a:xfrm>
+          <a:prstGeom prst="bentConnector3">
+            <a:avLst>
+              <a:gd name="adj1" fmla="val 50827"/>
+            </a:avLst>
+          </a:prstGeom>
+          <a:ln w="28575">
+            <a:solidFill>
+              <a:schemeClr val="accent2"/>
+            </a:solidFill>
+            <a:tailEnd type="arrow"/>
+          </a:ln>
+        </p:spPr>
+        <p:style>
+          <a:lnRef idx="1">
+            <a:schemeClr val="accent1"/>
+          </a:lnRef>
+          <a:fillRef idx="0">
+            <a:schemeClr val="accent1"/>
+          </a:fillRef>
+          <a:effectRef idx="0">
+            <a:schemeClr val="accent1"/>
+          </a:effectRef>
+          <a:fontRef idx="minor">
+            <a:schemeClr val="tx1"/>
+          </a:fontRef>
+        </p:style>
+      </p:cxnSp>
+      <p:cxnSp>
+        <p:nvCxnSpPr>
+          <p:cNvPr id="89" name="Connecteur droit 88"/>
+          <p:cNvCxnSpPr>
+            <a:stCxn id="54" idx="1"/>
+          </p:cNvCxnSpPr>
+          <p:nvPr/>
+        </p:nvCxnSpPr>
+        <p:spPr>
+          <a:xfrm flipH="1">
+            <a:off x="5940152" y="1684258"/>
+            <a:ext cx="288032" cy="16550"/>
+          </a:xfrm>
+          <a:prstGeom prst="line">
+            <a:avLst/>
+          </a:prstGeom>
+          <a:ln w="28575">
+            <a:solidFill>
+              <a:schemeClr val="accent2"/>
+            </a:solidFill>
+          </a:ln>
+        </p:spPr>
+        <p:style>
+          <a:lnRef idx="1">
+            <a:schemeClr val="accent1"/>
+          </a:lnRef>
+          <a:fillRef idx="0">
+            <a:schemeClr val="accent1"/>
+          </a:fillRef>
+          <a:effectRef idx="0">
+            <a:schemeClr val="accent1"/>
+          </a:effectRef>
+          <a:fontRef idx="minor">
+            <a:schemeClr val="tx1"/>
+          </a:fontRef>
+        </p:style>
+      </p:cxnSp>
+      <p:sp>
+        <p:nvSpPr>
+          <p:cNvPr id="91" name="ZoneTexte 90"/>
+          <p:cNvSpPr txBox="1"/>
+          <p:nvPr/>
+        </p:nvSpPr>
+        <p:spPr>
+          <a:xfrm>
+            <a:off x="2699792" y="3933056"/>
+            <a:ext cx="648072" cy="369332"/>
+          </a:xfrm>
+          <a:prstGeom prst="rect">
+            <a:avLst/>
+          </a:prstGeom>
+          <a:noFill/>
+        </p:spPr>
+        <p:txBody>
+          <a:bodyPr wrap="square" rtlCol="0">
+            <a:spAutoFit/>
+          </a:bodyPr>
+          <a:lstStyle/>
+          <a:p>
+            <a:r>
+              <a:rPr lang="fr-FR" dirty="0" smtClean="0"/>
+              <a:t>non</a:t>
+            </a:r>
+            <a:endParaRPr lang="fr-FR" dirty="0"/>
+          </a:p>
+        </p:txBody>
+      </p:sp>
+      <p:sp>
+        <p:nvSpPr>
+          <p:cNvPr id="92" name="ZoneTexte 91"/>
+          <p:cNvSpPr txBox="1"/>
+          <p:nvPr/>
+        </p:nvSpPr>
+        <p:spPr>
+          <a:xfrm>
+            <a:off x="7164288" y="620688"/>
+            <a:ext cx="648072" cy="369332"/>
+          </a:xfrm>
+          <a:prstGeom prst="rect">
+            <a:avLst/>
+          </a:prstGeom>
+          <a:noFill/>
+        </p:spPr>
+        <p:txBody>
+          <a:bodyPr wrap="square" rtlCol="0">
+            <a:spAutoFit/>
+          </a:bodyPr>
+          <a:lstStyle/>
+          <a:p>
+            <a:r>
+              <a:rPr lang="fr-FR" dirty="0" smtClean="0"/>
+              <a:t>oui</a:t>
+            </a:r>
+            <a:endParaRPr lang="fr-FR" dirty="0"/>
+          </a:p>
+        </p:txBody>
+      </p:sp>
+      <p:cxnSp>
+        <p:nvCxnSpPr>
+          <p:cNvPr id="93" name="Connecteur droit avec flèche 92"/>
+          <p:cNvCxnSpPr>
+            <a:stCxn id="4" idx="3"/>
+            <a:endCxn id="6" idx="1"/>
+          </p:cNvCxnSpPr>
+          <p:nvPr/>
+        </p:nvCxnSpPr>
+        <p:spPr>
+          <a:xfrm>
+            <a:off x="1944216" y="618365"/>
+            <a:ext cx="467544" cy="3025"/>
+          </a:xfrm>
+          <a:prstGeom prst="straightConnector1">
+            <a:avLst/>
+          </a:prstGeom>
+          <a:ln w="28575">
+            <a:solidFill>
+              <a:schemeClr val="accent2"/>
+            </a:solidFill>
+            <a:tailEnd type="arrow"/>
+          </a:ln>
+        </p:spPr>
+        <p:style>
+          <a:lnRef idx="1">
+            <a:schemeClr val="accent1"/>
+          </a:lnRef>
+          <a:fillRef idx="0">
+            <a:schemeClr val="accent1"/>
+          </a:fillRef>
+          <a:effectRef idx="0">
+            <a:schemeClr val="accent1"/>
+          </a:effectRef>
+          <a:fontRef idx="minor">
+            <a:schemeClr val="tx1"/>
+          </a:fontRef>
+        </p:style>
+      </p:cxnSp>
+      <p:cxnSp>
+        <p:nvCxnSpPr>
+          <p:cNvPr id="96" name="Connecteur droit avec flèche 95"/>
+          <p:cNvCxnSpPr>
+            <a:stCxn id="6" idx="3"/>
+            <a:endCxn id="53" idx="1"/>
+          </p:cNvCxnSpPr>
+          <p:nvPr/>
+        </p:nvCxnSpPr>
+        <p:spPr>
+          <a:xfrm>
+            <a:off x="4300846" y="621390"/>
+            <a:ext cx="415170" cy="798"/>
+          </a:xfrm>
+          <a:prstGeom prst="straightConnector1">
+            <a:avLst/>
+          </a:prstGeom>
+          <a:ln w="28575">
+            <a:solidFill>
+              <a:schemeClr val="accent2"/>
+            </a:solidFill>
+            <a:tailEnd type="arrow"/>
+          </a:ln>
+        </p:spPr>
+        <p:style>
+          <a:lnRef idx="1">
+            <a:schemeClr val="accent1"/>
+          </a:lnRef>
+          <a:fillRef idx="0">
+            <a:schemeClr val="accent1"/>
+          </a:fillRef>
+          <a:effectRef idx="0">
+            <a:schemeClr val="accent1"/>
+          </a:effectRef>
+          <a:fontRef idx="minor">
+            <a:schemeClr val="tx1"/>
+          </a:fontRef>
+        </p:style>
+      </p:cxnSp>
+      <p:cxnSp>
+        <p:nvCxnSpPr>
+          <p:cNvPr id="102" name="Forme 49"/>
+          <p:cNvCxnSpPr>
+            <a:endCxn id="7" idx="0"/>
+          </p:cNvCxnSpPr>
+          <p:nvPr/>
+        </p:nvCxnSpPr>
+        <p:spPr>
+          <a:xfrm>
+            <a:off x="1835696" y="1818946"/>
+            <a:ext cx="2304069" cy="529934"/>
+          </a:xfrm>
+          <a:prstGeom prst="bentConnector2">
+            <a:avLst/>
+          </a:prstGeom>
+          <a:ln w="28575">
+            <a:solidFill>
+              <a:schemeClr val="accent2"/>
+            </a:solidFill>
+            <a:tailEnd type="arrow"/>
+          </a:ln>
+        </p:spPr>
+        <p:style>
+          <a:lnRef idx="1">
+            <a:schemeClr val="accent1"/>
+          </a:lnRef>
+          <a:fillRef idx="0">
+            <a:schemeClr val="accent1"/>
+          </a:fillRef>
+          <a:effectRef idx="0">
+            <a:schemeClr val="accent1"/>
+          </a:effectRef>
+          <a:fontRef idx="minor">
+            <a:schemeClr val="tx1"/>
+          </a:fontRef>
+        </p:style>
+      </p:cxnSp>
+      <p:sp>
+        <p:nvSpPr>
+          <p:cNvPr id="122" name="Flèche vers le bas 121"/>
+          <p:cNvSpPr/>
+          <p:nvPr/>
+        </p:nvSpPr>
+        <p:spPr>
+          <a:xfrm>
+            <a:off x="5868144" y="3320152"/>
+            <a:ext cx="1728192" cy="468888"/>
+          </a:xfrm>
+          <a:prstGeom prst="downArrow">
+            <a:avLst/>
+          </a:prstGeom>
+        </p:spPr>
+        <p:style>
+          <a:lnRef idx="2">
+            <a:schemeClr val="accent1">
+              <a:shade val="50000"/>
+            </a:schemeClr>
+          </a:lnRef>
+          <a:fillRef idx="1">
+            <a:schemeClr val="accent1"/>
+          </a:fillRef>
+          <a:effectRef idx="0">
+            <a:schemeClr val="accent1"/>
+          </a:effectRef>
+          <a:fontRef idx="minor">
+            <a:schemeClr val="lt1"/>
+          </a:fontRef>
+        </p:style>
+        <p:txBody>
+          <a:bodyPr rtlCol="0" anchor="ctr"/>
+          <a:lstStyle/>
+          <a:p>
+            <a:pPr algn="ctr"/>
+            <a:r>
+              <a:rPr lang="fr-FR" dirty="0" err="1" smtClean="0"/>
+              <a:t>include</a:t>
+            </a:r>
+            <a:endParaRPr lang="fr-FR" dirty="0"/>
+          </a:p>
+        </p:txBody>
+      </p:sp>
     </p:spTree>
   </p:cSld>
   <p:clrMapOvr>

</xml_diff>